<commit_message>
xii intro to sql
</commit_message>
<xml_diff>
--- a/XI class/01. OOP - Module 1/03. Изчислителни процеси. Линейни процеси/Изчислителни процеси. Линейни процеси.pptx
+++ b/XI class/01. OOP - Module 1/03. Изчислителни процеси. Линейни процеси/Изчислителни процеси. Линейни процеси.pptx
@@ -110,6 +110,11 @@
       </a:defRPr>
     </a:lvl9pPr>
   </p:defaultTextStyle>
+  <p:extLst>
+    <p:ext uri="{EFAFB233-063F-42B5-8137-9DF3F51BA10A}">
+      <p15:sldGuideLst xmlns:p15="http://schemas.microsoft.com/office/powerpoint/2012/main"/>
+    </p:ext>
+  </p:extLst>
 </p:presentation>
 </file>
 
@@ -269,7 +274,7 @@
           <a:p>
             <a:fld id="{4EC743F4-8769-40B4-85DF-6CB8DE9F66AA}" type="datetimeFigureOut">
               <a:rPr lang="en-US" smtClean="0"/>
-              <a:t>9/30/2023</a:t>
+              <a:t>9/24/2024</a:t>
             </a:fld>
             <a:endParaRPr lang="en-US"/>
           </a:p>
@@ -812,7 +817,7 @@
           <a:p>
             <a:fld id="{4EC743F4-8769-40B4-85DF-6CB8DE9F66AA}" type="datetimeFigureOut">
               <a:rPr lang="en-US" smtClean="0"/>
-              <a:t>9/30/2023</a:t>
+              <a:t>9/24/2024</a:t>
             </a:fld>
             <a:endParaRPr lang="en-US"/>
           </a:p>
@@ -1020,7 +1025,7 @@
           <a:p>
             <a:fld id="{4EC743F4-8769-40B4-85DF-6CB8DE9F66AA}" type="datetimeFigureOut">
               <a:rPr lang="en-US" smtClean="0"/>
-              <a:t>9/30/2023</a:t>
+              <a:t>9/24/2024</a:t>
             </a:fld>
             <a:endParaRPr lang="en-US"/>
           </a:p>
@@ -1219,7 +1224,7 @@
           <a:p>
             <a:fld id="{4EC743F4-8769-40B4-85DF-6CB8DE9F66AA}" type="datetimeFigureOut">
               <a:rPr lang="en-US" smtClean="0"/>
-              <a:t>9/30/2023</a:t>
+              <a:t>9/24/2024</a:t>
             </a:fld>
             <a:endParaRPr lang="en-US"/>
           </a:p>
@@ -1502,7 +1507,7 @@
           <a:p>
             <a:fld id="{4EC743F4-8769-40B4-85DF-6CB8DE9F66AA}" type="datetimeFigureOut">
               <a:rPr lang="en-US" smtClean="0"/>
-              <a:t>9/30/2023</a:t>
+              <a:t>9/24/2024</a:t>
             </a:fld>
             <a:endParaRPr lang="en-US" dirty="0"/>
           </a:p>
@@ -2453,7 +2458,7 @@
           <a:p>
             <a:fld id="{4EC743F4-8769-40B4-85DF-6CB8DE9F66AA}" type="datetimeFigureOut">
               <a:rPr lang="en-US" smtClean="0"/>
-              <a:t>9/30/2023</a:t>
+              <a:t>9/24/2024</a:t>
             </a:fld>
             <a:endParaRPr lang="en-US"/>
           </a:p>
@@ -2872,7 +2877,7 @@
           <a:p>
             <a:fld id="{4EC743F4-8769-40B4-85DF-6CB8DE9F66AA}" type="datetimeFigureOut">
               <a:rPr lang="en-US" smtClean="0"/>
-              <a:t>9/30/2023</a:t>
+              <a:t>9/24/2024</a:t>
             </a:fld>
             <a:endParaRPr lang="en-US"/>
           </a:p>
@@ -3013,7 +3018,7 @@
           <a:p>
             <a:fld id="{4EC743F4-8769-40B4-85DF-6CB8DE9F66AA}" type="datetimeFigureOut">
               <a:rPr lang="en-US" smtClean="0"/>
-              <a:t>9/30/2023</a:t>
+              <a:t>9/24/2024</a:t>
             </a:fld>
             <a:endParaRPr lang="en-US"/>
           </a:p>
@@ -3126,7 +3131,7 @@
           <a:p>
             <a:fld id="{4EC743F4-8769-40B4-85DF-6CB8DE9F66AA}" type="datetimeFigureOut">
               <a:rPr lang="en-US" smtClean="0"/>
-              <a:t>9/30/2023</a:t>
+              <a:t>9/24/2024</a:t>
             </a:fld>
             <a:endParaRPr lang="en-US"/>
           </a:p>
@@ -3443,7 +3448,7 @@
           <a:p>
             <a:fld id="{4EC743F4-8769-40B4-85DF-6CB8DE9F66AA}" type="datetimeFigureOut">
               <a:rPr lang="en-US" smtClean="0"/>
-              <a:t>9/30/2023</a:t>
+              <a:t>9/24/2024</a:t>
             </a:fld>
             <a:endParaRPr lang="en-US"/>
           </a:p>
@@ -3788,7 +3793,7 @@
           <a:p>
             <a:fld id="{4EC743F4-8769-40B4-85DF-6CB8DE9F66AA}" type="datetimeFigureOut">
               <a:rPr lang="en-US" smtClean="0"/>
-              <a:t>9/30/2023</a:t>
+              <a:t>9/24/2024</a:t>
             </a:fld>
             <a:endParaRPr lang="en-US"/>
           </a:p>
@@ -4083,7 +4088,7 @@
             <a:fld id="{4EC743F4-8769-40B4-85DF-6CB8DE9F66AA}" type="datetimeFigureOut">
               <a:rPr lang="en-US" smtClean="0"/>
               <a:pPr/>
-              <a:t>9/30/2023</a:t>
+              <a:t>9/24/2024</a:t>
             </a:fld>
             <a:endParaRPr lang="en-US" dirty="0"/>
           </a:p>

</xml_diff>